<commit_message>
Updated slides and scripts
</commit_message>
<xml_diff>
--- a/2022Nov11_IntroToSeuratWorkshop_QNN/2022Nov11_IntroToSeuratWorkshop_QNN.pptx
+++ b/2022Nov11_IntroToSeuratWorkshop_QNN/2022Nov11_IntroToSeuratWorkshop_QNN.pptx
@@ -9415,7 +9415,7 @@
         <p:spPr>
           <a:xfrm>
             <a:off x="1658912" y="3018719"/>
-            <a:ext cx="8874176" cy="1200329"/>
+            <a:ext cx="8874176" cy="646331"/>
           </a:xfrm>
           <a:prstGeom prst="rect">
             <a:avLst/>
@@ -9442,15 +9442,12 @@
                 <a:cs typeface="Arial" panose="020B0604020202020204" pitchFamily="34" charset="0"/>
                 <a:hlinkClick r:id="rId2"/>
               </a:rPr>
-              <a:t>https://github.com/denvercal1234GitHub/learntoRfromNothing/blob/043c9af5500d7d7bf09676f4c9e0c7e07177a834/2022Nov11_IntroToSeuratWorkshop_QNN/2022Nov11_IntroToSeuratWorkshop_QNN.Rmd</a:t>
-            </a:r>
-            <a:r>
-              <a:rPr lang="en-US" b="1" dirty="0">
-                <a:latin typeface="Arial" panose="020B0604020202020204" pitchFamily="34" charset="0"/>
-                <a:cs typeface="Arial" panose="020B0604020202020204" pitchFamily="34" charset="0"/>
-              </a:rPr>
-              <a:t> </a:t>
-            </a:r>
+              <a:t>https://github.com/denvercal1234GitHub/learntoRfromNothing/</a:t>
+            </a:r>
+            <a:endParaRPr lang="en-US" b="1" dirty="0">
+              <a:latin typeface="Arial" panose="020B0604020202020204" pitchFamily="34" charset="0"/>
+              <a:cs typeface="Arial" panose="020B0604020202020204" pitchFamily="34" charset="0"/>
+            </a:endParaRPr>
           </a:p>
         </p:txBody>
       </p:sp>
@@ -9707,7 +9704,7 @@
           <p:nvPr>
             <p:extLst>
               <p:ext uri="{D42A27DB-BD31-4B8C-83A1-F6EECF244321}">
-                <p14:modId xmlns:p14="http://schemas.microsoft.com/office/powerpoint/2010/main" val="2862320029"/>
+                <p14:modId xmlns:p14="http://schemas.microsoft.com/office/powerpoint/2010/main" val="7126856"/>
               </p:ext>
             </p:extLst>
           </p:nvPr>
@@ -9756,7 +9753,7 @@
                       </a:r>
                     </a:p>
                   </a:txBody>
-                  <a:tcPr>
+                  <a:tcPr anchor="ctr">
                     <a:lnL w="12700" cap="flat" cmpd="sng" algn="ctr">
                       <a:solidFill>
                         <a:schemeClr val="tx1"/>
@@ -9830,7 +9827,7 @@
                       </a:r>
                     </a:p>
                   </a:txBody>
-                  <a:tcPr>
+                  <a:tcPr anchor="ctr">
                     <a:lnL w="12700" cap="flat" cmpd="sng" algn="ctr">
                       <a:solidFill>
                         <a:schemeClr val="tx1"/>
@@ -9894,7 +9891,7 @@
                       </a:r>
                     </a:p>
                   </a:txBody>
-                  <a:tcPr>
+                  <a:tcPr anchor="ctr">
                     <a:lnL w="12700" cap="flat" cmpd="sng" algn="ctr">
                       <a:solidFill>
                         <a:schemeClr val="tx1"/>
@@ -9968,7 +9965,7 @@
                       </a:r>
                     </a:p>
                   </a:txBody>
-                  <a:tcPr>
+                  <a:tcPr anchor="ctr">
                     <a:lnL w="12700" cap="flat" cmpd="sng" algn="ctr">
                       <a:solidFill>
                         <a:schemeClr val="tx1"/>
@@ -10069,7 +10066,7 @@
                       </a:r>
                     </a:p>
                   </a:txBody>
-                  <a:tcPr>
+                  <a:tcPr anchor="ctr">
                     <a:lnL w="12700" cap="flat" cmpd="sng" algn="ctr">
                       <a:solidFill>
                         <a:schemeClr val="tx1"/>
@@ -10143,7 +10140,7 @@
                       </a:r>
                     </a:p>
                   </a:txBody>
-                  <a:tcPr>
+                  <a:tcPr anchor="ctr">
                     <a:lnL w="12700" cap="flat" cmpd="sng" algn="ctr">
                       <a:solidFill>
                         <a:schemeClr val="tx1"/>
@@ -10207,7 +10204,7 @@
                       </a:r>
                     </a:p>
                   </a:txBody>
-                  <a:tcPr>
+                  <a:tcPr anchor="ctr">
                     <a:lnL w="12700" cap="flat" cmpd="sng" algn="ctr">
                       <a:solidFill>
                         <a:schemeClr val="tx1"/>
@@ -10307,7 +10304,7 @@
                       </a:r>
                     </a:p>
                   </a:txBody>
-                  <a:tcPr>
+                  <a:tcPr anchor="ctr">
                     <a:lnL w="12700" cap="flat" cmpd="sng" algn="ctr">
                       <a:solidFill>
                         <a:schemeClr val="tx1"/>

</xml_diff>

<commit_message>
Updated slides and script
</commit_message>
<xml_diff>
--- a/2022Nov11_IntroToSeuratWorkshop_QNN/2022Nov11_IntroToSeuratWorkshop_QNN.pptx
+++ b/2022Nov11_IntroToSeuratWorkshop_QNN/2022Nov11_IntroToSeuratWorkshop_QNN.pptx
@@ -203,7 +203,7 @@
           <a:p>
             <a:fld id="{1B6E4DC7-6B36-724F-B33C-F92B8BD644E4}" type="datetimeFigureOut">
               <a:rPr lang="en-US" smtClean="0"/>
-              <a:t>11/11/22</a:t>
+              <a:t>11/12/22</a:t>
             </a:fld>
             <a:endParaRPr lang="en-US"/>
           </a:p>
@@ -515,22 +515,6 @@
           <a:bodyPr/>
           <a:lstStyle/>
           <a:p>
-            <a:r>
-              <a:rPr lang="en-US" dirty="0"/>
-              <a:t>https://</a:t>
-            </a:r>
-            <a:r>
-              <a:rPr lang="en-US" dirty="0" err="1"/>
-              <a:t>admin.typeform.com</a:t>
-            </a:r>
-            <a:r>
-              <a:rPr lang="en-US" dirty="0"/>
-              <a:t>/accounts/01GHHK0YY4MX65ECJ7MJGWEKKE/workspaces/</a:t>
-            </a:r>
-            <a:r>
-              <a:rPr lang="en-US" dirty="0" err="1"/>
-              <a:t>DTErwe</a:t>
-            </a:r>
             <a:endParaRPr lang="en-US" dirty="0"/>
           </a:p>
         </p:txBody>
@@ -2738,7 +2722,7 @@
           <a:p>
             <a:fld id="{17CD738D-6092-3749-ACF8-102458D2B925}" type="datetimeFigureOut">
               <a:rPr lang="en-US" smtClean="0"/>
-              <a:t>11/11/22</a:t>
+              <a:t>11/12/22</a:t>
             </a:fld>
             <a:endParaRPr lang="en-US"/>
           </a:p>
@@ -2938,7 +2922,7 @@
           <a:p>
             <a:fld id="{17CD738D-6092-3749-ACF8-102458D2B925}" type="datetimeFigureOut">
               <a:rPr lang="en-US" smtClean="0"/>
-              <a:t>11/11/22</a:t>
+              <a:t>11/12/22</a:t>
             </a:fld>
             <a:endParaRPr lang="en-US"/>
           </a:p>
@@ -3148,7 +3132,7 @@
           <a:p>
             <a:fld id="{17CD738D-6092-3749-ACF8-102458D2B925}" type="datetimeFigureOut">
               <a:rPr lang="en-US" smtClean="0"/>
-              <a:t>11/11/22</a:t>
+              <a:t>11/12/22</a:t>
             </a:fld>
             <a:endParaRPr lang="en-US"/>
           </a:p>
@@ -3348,7 +3332,7 @@
           <a:p>
             <a:fld id="{17CD738D-6092-3749-ACF8-102458D2B925}" type="datetimeFigureOut">
               <a:rPr lang="en-US" smtClean="0"/>
-              <a:t>11/11/22</a:t>
+              <a:t>11/12/22</a:t>
             </a:fld>
             <a:endParaRPr lang="en-US"/>
           </a:p>
@@ -3624,7 +3608,7 @@
           <a:p>
             <a:fld id="{17CD738D-6092-3749-ACF8-102458D2B925}" type="datetimeFigureOut">
               <a:rPr lang="en-US" smtClean="0"/>
-              <a:t>11/11/22</a:t>
+              <a:t>11/12/22</a:t>
             </a:fld>
             <a:endParaRPr lang="en-US"/>
           </a:p>
@@ -3892,7 +3876,7 @@
           <a:p>
             <a:fld id="{17CD738D-6092-3749-ACF8-102458D2B925}" type="datetimeFigureOut">
               <a:rPr lang="en-US" smtClean="0"/>
-              <a:t>11/11/22</a:t>
+              <a:t>11/12/22</a:t>
             </a:fld>
             <a:endParaRPr lang="en-US"/>
           </a:p>
@@ -4307,7 +4291,7 @@
           <a:p>
             <a:fld id="{17CD738D-6092-3749-ACF8-102458D2B925}" type="datetimeFigureOut">
               <a:rPr lang="en-US" smtClean="0"/>
-              <a:t>11/11/22</a:t>
+              <a:t>11/12/22</a:t>
             </a:fld>
             <a:endParaRPr lang="en-US"/>
           </a:p>
@@ -4449,7 +4433,7 @@
           <a:p>
             <a:fld id="{17CD738D-6092-3749-ACF8-102458D2B925}" type="datetimeFigureOut">
               <a:rPr lang="en-US" smtClean="0"/>
-              <a:t>11/11/22</a:t>
+              <a:t>11/12/22</a:t>
             </a:fld>
             <a:endParaRPr lang="en-US"/>
           </a:p>
@@ -4562,7 +4546,7 @@
           <a:p>
             <a:fld id="{17CD738D-6092-3749-ACF8-102458D2B925}" type="datetimeFigureOut">
               <a:rPr lang="en-US" smtClean="0"/>
-              <a:t>11/11/22</a:t>
+              <a:t>11/12/22</a:t>
             </a:fld>
             <a:endParaRPr lang="en-US"/>
           </a:p>
@@ -4875,7 +4859,7 @@
           <a:p>
             <a:fld id="{17CD738D-6092-3749-ACF8-102458D2B925}" type="datetimeFigureOut">
               <a:rPr lang="en-US" smtClean="0"/>
-              <a:t>11/11/22</a:t>
+              <a:t>11/12/22</a:t>
             </a:fld>
             <a:endParaRPr lang="en-US"/>
           </a:p>
@@ -5164,7 +5148,7 @@
           <a:p>
             <a:fld id="{17CD738D-6092-3749-ACF8-102458D2B925}" type="datetimeFigureOut">
               <a:rPr lang="en-US" smtClean="0"/>
-              <a:t>11/11/22</a:t>
+              <a:t>11/12/22</a:t>
             </a:fld>
             <a:endParaRPr lang="en-US"/>
           </a:p>
@@ -5407,7 +5391,7 @@
           <a:p>
             <a:fld id="{17CD738D-6092-3749-ACF8-102458D2B925}" type="datetimeFigureOut">
               <a:rPr lang="en-US" smtClean="0"/>
-              <a:t>11/11/22</a:t>
+              <a:t>11/12/22</a:t>
             </a:fld>
             <a:endParaRPr lang="en-US"/>
           </a:p>
@@ -5838,7 +5822,7 @@
         </p:nvSpPr>
         <p:spPr>
           <a:xfrm>
-            <a:off x="0" y="864766"/>
+            <a:off x="0" y="774825"/>
             <a:ext cx="12192000" cy="1077218"/>
           </a:xfrm>
           <a:prstGeom prst="rect">
@@ -5881,7 +5865,7 @@
                 <a:latin typeface="Arial" panose="020B0604020202020204" pitchFamily="34" charset="0"/>
                 <a:cs typeface="Arial" panose="020B0604020202020204" pitchFamily="34" charset="0"/>
               </a:rPr>
-              <a:t> analysis: Details tutorials did not specify but you should know</a:t>
+              <a:t> analysis: Details tutorials did not specify, but you should know</a:t>
             </a:r>
             <a:endParaRPr lang="en-US" sz="3200" b="1" dirty="0">
               <a:solidFill>
@@ -5907,8 +5891,8 @@
         </p:nvSpPr>
         <p:spPr>
           <a:xfrm>
-            <a:off x="3451686" y="2288710"/>
-            <a:ext cx="5288627" cy="3108543"/>
+            <a:off x="2832644" y="2288710"/>
+            <a:ext cx="6526723" cy="3108543"/>
           </a:xfrm>
           <a:prstGeom prst="rect">
             <a:avLst/>
@@ -5964,7 +5948,7 @@
                 <a:latin typeface="Arial" panose="020B0604020202020204" pitchFamily="34" charset="0"/>
                 <a:cs typeface="Arial" panose="020B0604020202020204" pitchFamily="34" charset="0"/>
               </a:rPr>
-              <a:t>Immunology</a:t>
+              <a:t>T cell immunology, Oxford University</a:t>
             </a:r>
           </a:p>
           <a:p>
@@ -5977,12 +5961,11 @@
           <a:p>
             <a:pPr algn="ctr"/>
             <a:r>
-              <a:rPr lang="en-US" sz="2800" b="1" dirty="0">
+              <a:rPr lang="en-US" sz="2800" b="1" dirty="0" err="1">
                 <a:latin typeface="Arial" panose="020B0604020202020204" pitchFamily="34" charset="0"/>
                 <a:cs typeface="Arial" panose="020B0604020202020204" pitchFamily="34" charset="0"/>
-                <a:hlinkClick r:id="rId2"/>
-              </a:rPr>
-              <a:t>quang.nguyen@ndm.ox.ac.uk</a:t>
+              </a:rPr>
+              <a:t>quang.n.nguyen@alumni.duke.edu</a:t>
             </a:r>
             <a:endParaRPr lang="en-US" sz="2800" b="1" dirty="0">
               <a:latin typeface="Arial" panose="020B0604020202020204" pitchFamily="34" charset="0"/>
@@ -6006,7 +5989,7 @@
           <p:nvPr/>
         </p:nvPicPr>
         <p:blipFill>
-          <a:blip r:embed="rId3"/>
+          <a:blip r:embed="rId2"/>
           <a:stretch>
             <a:fillRect/>
           </a:stretch>
@@ -6079,7 +6062,7 @@
           <p:nvPr/>
         </p:nvPicPr>
         <p:blipFill rotWithShape="1">
-          <a:blip r:embed="rId4"/>
+          <a:blip r:embed="rId3"/>
           <a:srcRect r="63733"/>
           <a:stretch/>
         </p:blipFill>
@@ -6126,7 +6109,7 @@
               <a:rPr lang="en-US" sz="2800" b="1" dirty="0" err="1">
                 <a:latin typeface="Arial" panose="020B0604020202020204" pitchFamily="34" charset="0"/>
                 <a:cs typeface="Arial" panose="020B0604020202020204" pitchFamily="34" charset="0"/>
-                <a:hlinkClick r:id="rId5"/>
+                <a:hlinkClick r:id="rId4"/>
               </a:rPr>
               <a:t>QNNDukeNguyen</a:t>
             </a:r>
@@ -6583,7 +6566,7 @@
         </p:nvSpPr>
         <p:spPr>
           <a:xfrm>
-            <a:off x="0" y="104589"/>
+            <a:off x="-1" y="235217"/>
             <a:ext cx="12192000" cy="584775"/>
           </a:xfrm>
           <a:prstGeom prst="rect">
@@ -6626,14 +6609,14 @@
           <p:nvPr>
             <p:extLst>
               <p:ext uri="{D42A27DB-BD31-4B8C-83A1-F6EECF244321}">
-                <p14:modId xmlns:p14="http://schemas.microsoft.com/office/powerpoint/2010/main" val="2288701333"/>
+                <p14:modId xmlns:p14="http://schemas.microsoft.com/office/powerpoint/2010/main" val="2678852206"/>
               </p:ext>
             </p:extLst>
           </p:nvPr>
         </p:nvGraphicFramePr>
         <p:xfrm>
-          <a:off x="478971" y="1119934"/>
-          <a:ext cx="11234057" cy="4815840"/>
+          <a:off x="478971" y="1441482"/>
+          <a:ext cx="11234057" cy="3718560"/>
         </p:xfrm>
         <a:graphic>
           <a:graphicData uri="http://schemas.openxmlformats.org/drawingml/2006/table">
@@ -6777,176 +6760,6 @@
                 <a:extLst>
                   <a:ext uri="{0D108BD9-81ED-4DB2-BD59-A6C34878D82A}">
                     <a16:rowId xmlns:a16="http://schemas.microsoft.com/office/drawing/2014/main" val="3342161968"/>
-                  </a:ext>
-                </a:extLst>
-              </a:tr>
-              <a:tr h="370840">
-                <a:tc>
-                  <a:txBody>
-                    <a:bodyPr/>
-                    <a:lstStyle/>
-                    <a:p>
-                      <a:pPr algn="l"/>
-                      <a:r>
-                        <a:rPr lang="en-US" sz="2000" dirty="0">
-                          <a:solidFill>
-                            <a:schemeClr val="tx1"/>
-                          </a:solidFill>
-                          <a:latin typeface="Arial" panose="020B0604020202020204" pitchFamily="34" charset="0"/>
-                          <a:cs typeface="Arial" panose="020B0604020202020204" pitchFamily="34" charset="0"/>
-                        </a:rPr>
-                        <a:t>Sign in</a:t>
-                      </a:r>
-                    </a:p>
-                    <a:p>
-                      <a:pPr algn="l"/>
-                      <a:r>
-                        <a:rPr lang="en-US" sz="2000" dirty="0">
-                          <a:solidFill>
-                            <a:schemeClr val="tx1"/>
-                          </a:solidFill>
-                          <a:latin typeface="Arial" panose="020B0604020202020204" pitchFamily="34" charset="0"/>
-                          <a:cs typeface="Arial" panose="020B0604020202020204" pitchFamily="34" charset="0"/>
-                        </a:rPr>
-                        <a:t>Enter poll: </a:t>
-                      </a:r>
-                      <a:r>
-                        <a:rPr lang="en-US" sz="2000" dirty="0">
-                          <a:solidFill>
-                            <a:schemeClr val="tx1"/>
-                          </a:solidFill>
-                          <a:latin typeface="Arial" panose="020B0604020202020204" pitchFamily="34" charset="0"/>
-                          <a:cs typeface="Arial" panose="020B0604020202020204" pitchFamily="34" charset="0"/>
-                          <a:hlinkClick r:id="rId3"/>
-                        </a:rPr>
-                        <a:t>https://bit.ly/IntroSeurat_Enter</a:t>
-                      </a:r>
-                      <a:r>
-                        <a:rPr lang="en-US" sz="2000" dirty="0">
-                          <a:solidFill>
-                            <a:schemeClr val="tx1"/>
-                          </a:solidFill>
-                          <a:latin typeface="Arial" panose="020B0604020202020204" pitchFamily="34" charset="0"/>
-                          <a:cs typeface="Arial" panose="020B0604020202020204" pitchFamily="34" charset="0"/>
-                        </a:rPr>
-                        <a:t> </a:t>
-                      </a:r>
-                    </a:p>
-                    <a:p>
-                      <a:pPr algn="l"/>
-                      <a:r>
-                        <a:rPr lang="en-US" sz="2000" dirty="0">
-                          <a:solidFill>
-                            <a:schemeClr val="tx1"/>
-                          </a:solidFill>
-                          <a:latin typeface="Arial" panose="020B0604020202020204" pitchFamily="34" charset="0"/>
-                          <a:cs typeface="Arial" panose="020B0604020202020204" pitchFamily="34" charset="0"/>
-                        </a:rPr>
-                        <a:t>Install packages</a:t>
-                      </a:r>
-                    </a:p>
-                  </a:txBody>
-                  <a:tcPr anchor="ctr">
-                    <a:lnL w="12700" cap="flat" cmpd="sng" algn="ctr">
-                      <a:solidFill>
-                        <a:schemeClr val="tx1"/>
-                      </a:solidFill>
-                      <a:prstDash val="solid"/>
-                      <a:round/>
-                      <a:headEnd type="none" w="med" len="med"/>
-                      <a:tailEnd type="none" w="med" len="med"/>
-                    </a:lnL>
-                    <a:lnR w="12700" cap="flat" cmpd="sng" algn="ctr">
-                      <a:solidFill>
-                        <a:schemeClr val="tx1"/>
-                      </a:solidFill>
-                      <a:prstDash val="solid"/>
-                      <a:round/>
-                      <a:headEnd type="none" w="med" len="med"/>
-                      <a:tailEnd type="none" w="med" len="med"/>
-                    </a:lnR>
-                    <a:lnT w="12700" cap="flat" cmpd="sng" algn="ctr">
-                      <a:solidFill>
-                        <a:schemeClr val="tx1"/>
-                      </a:solidFill>
-                      <a:prstDash val="solid"/>
-                      <a:round/>
-                      <a:headEnd type="none" w="med" len="med"/>
-                      <a:tailEnd type="none" w="med" len="med"/>
-                    </a:lnT>
-                    <a:lnB w="12700" cap="flat" cmpd="sng" algn="ctr">
-                      <a:solidFill>
-                        <a:schemeClr val="tx1"/>
-                      </a:solidFill>
-                      <a:prstDash val="solid"/>
-                      <a:round/>
-                      <a:headEnd type="none" w="med" len="med"/>
-                      <a:tailEnd type="none" w="med" len="med"/>
-                    </a:lnB>
-                    <a:noFill/>
-                  </a:tcPr>
-                </a:tc>
-                <a:tc>
-                  <a:txBody>
-                    <a:bodyPr/>
-                    <a:lstStyle/>
-                    <a:p>
-                      <a:pPr algn="ctr"/>
-                      <a:r>
-                        <a:rPr lang="en-US" sz="2000" dirty="0">
-                          <a:solidFill>
-                            <a:schemeClr val="tx1"/>
-                          </a:solidFill>
-                          <a:latin typeface="Arial" panose="020B0604020202020204" pitchFamily="34" charset="0"/>
-                          <a:cs typeface="Arial" panose="020B0604020202020204" pitchFamily="34" charset="0"/>
-                        </a:rPr>
-                        <a:t>5</a:t>
-                      </a:r>
-                    </a:p>
-                  </a:txBody>
-                  <a:tcPr anchor="ctr">
-                    <a:lnL w="12700" cap="flat" cmpd="sng" algn="ctr">
-                      <a:solidFill>
-                        <a:schemeClr val="tx1"/>
-                      </a:solidFill>
-                      <a:prstDash val="solid"/>
-                      <a:round/>
-                      <a:headEnd type="none" w="med" len="med"/>
-                      <a:tailEnd type="none" w="med" len="med"/>
-                    </a:lnL>
-                    <a:lnR w="12700" cap="flat" cmpd="sng" algn="ctr">
-                      <a:solidFill>
-                        <a:schemeClr val="tx1"/>
-                      </a:solidFill>
-                      <a:prstDash val="solid"/>
-                      <a:round/>
-                      <a:headEnd type="none" w="med" len="med"/>
-                      <a:tailEnd type="none" w="med" len="med"/>
-                    </a:lnR>
-                    <a:lnT w="12700" cap="flat" cmpd="sng" algn="ctr">
-                      <a:solidFill>
-                        <a:schemeClr val="tx1"/>
-                      </a:solidFill>
-                      <a:prstDash val="solid"/>
-                      <a:round/>
-                      <a:headEnd type="none" w="med" len="med"/>
-                      <a:tailEnd type="none" w="med" len="med"/>
-                    </a:lnT>
-                    <a:lnB w="12700" cap="flat" cmpd="sng" algn="ctr">
-                      <a:solidFill>
-                        <a:schemeClr val="tx1"/>
-                      </a:solidFill>
-                      <a:prstDash val="solid"/>
-                      <a:round/>
-                      <a:headEnd type="none" w="med" len="med"/>
-                      <a:tailEnd type="none" w="med" len="med"/>
-                    </a:lnB>
-                    <a:noFill/>
-                  </a:tcPr>
-                </a:tc>
-                <a:extLst>
-                  <a:ext uri="{0D108BD9-81ED-4DB2-BD59-A6C34878D82A}">
-                    <a16:rowId xmlns:a16="http://schemas.microsoft.com/office/drawing/2014/main" val="2125908037"/>
                   </a:ext>
                 </a:extLst>
               </a:tr>
@@ -7129,7 +6942,22 @@
                           <a:latin typeface="Arial" panose="020B0604020202020204" pitchFamily="34" charset="0"/>
                           <a:cs typeface="Arial" panose="020B0604020202020204" pitchFamily="34" charset="0"/>
                         </a:rPr>
-                        <a:t>SMALL EXERCISE: Why this </a:t>
+                        <a:t>SMALL EXERCISE: </a:t>
+                      </a:r>
+                    </a:p>
+                    <a:p>
+                      <a:pPr algn="l"/>
+                      <a:r>
+                        <a:rPr lang="en-US" sz="2000" b="1" i="1" dirty="0">
+                          <a:solidFill>
+                            <a:schemeClr val="accent6">
+                              <a:lumMod val="75000"/>
+                            </a:schemeClr>
+                          </a:solidFill>
+                          <a:latin typeface="Arial" panose="020B0604020202020204" pitchFamily="34" charset="0"/>
+                          <a:cs typeface="Arial" panose="020B0604020202020204" pitchFamily="34" charset="0"/>
+                        </a:rPr>
+                        <a:t>Why this </a:t>
                       </a:r>
                       <a:r>
                         <a:rPr lang="en-US" sz="2000" b="1" i="1" dirty="0" err="1">
@@ -7340,7 +7168,22 @@
                           <a:latin typeface="Arial" panose="020B0604020202020204" pitchFamily="34" charset="0"/>
                           <a:cs typeface="Arial" panose="020B0604020202020204" pitchFamily="34" charset="0"/>
                         </a:rPr>
-                        <a:t>MEGA EXERCISE: Are there more CD8 or CD4 T cells in PBMCs?– 10mins</a:t>
+                        <a:t>MEGA EXERCISE: </a:t>
+                      </a:r>
+                    </a:p>
+                    <a:p>
+                      <a:pPr algn="l"/>
+                      <a:r>
+                        <a:rPr lang="en-US" sz="2000" b="1" i="1" dirty="0">
+                          <a:solidFill>
+                            <a:schemeClr val="accent6">
+                              <a:lumMod val="75000"/>
+                            </a:schemeClr>
+                          </a:solidFill>
+                          <a:latin typeface="Arial" panose="020B0604020202020204" pitchFamily="34" charset="0"/>
+                          <a:cs typeface="Arial" panose="020B0604020202020204" pitchFamily="34" charset="0"/>
+                        </a:rPr>
+                        <a:t>Are there more CD8 or CD4 T cells in PBMCs?– 10mins</a:t>
                       </a:r>
                     </a:p>
                   </a:txBody>
@@ -7445,150 +7288,6 @@
                 <a:extLst>
                   <a:ext uri="{0D108BD9-81ED-4DB2-BD59-A6C34878D82A}">
                     <a16:rowId xmlns:a16="http://schemas.microsoft.com/office/drawing/2014/main" val="4094808494"/>
-                  </a:ext>
-                </a:extLst>
-              </a:tr>
-              <a:tr h="370840">
-                <a:tc>
-                  <a:txBody>
-                    <a:bodyPr/>
-                    <a:lstStyle/>
-                    <a:p>
-                      <a:pPr algn="l"/>
-                      <a:r>
-                        <a:rPr lang="en-US" sz="2000" dirty="0">
-                          <a:solidFill>
-                            <a:schemeClr val="tx1"/>
-                          </a:solidFill>
-                          <a:latin typeface="Arial" panose="020B0604020202020204" pitchFamily="34" charset="0"/>
-                          <a:cs typeface="Arial" panose="020B0604020202020204" pitchFamily="34" charset="0"/>
-                        </a:rPr>
-                        <a:t>Exit poll: </a:t>
-                      </a:r>
-                      <a:r>
-                        <a:rPr lang="en-US" sz="2000" dirty="0">
-                          <a:solidFill>
-                            <a:schemeClr val="tx1"/>
-                          </a:solidFill>
-                          <a:latin typeface="Arial" panose="020B0604020202020204" pitchFamily="34" charset="0"/>
-                          <a:cs typeface="Arial" panose="020B0604020202020204" pitchFamily="34" charset="0"/>
-                          <a:hlinkClick r:id="rId4"/>
-                        </a:rPr>
-                        <a:t>https://bit.ly/IntroSeurat_Exit</a:t>
-                      </a:r>
-                      <a:r>
-                        <a:rPr lang="en-US" sz="2000" dirty="0">
-                          <a:solidFill>
-                            <a:schemeClr val="tx1"/>
-                          </a:solidFill>
-                          <a:latin typeface="Arial" panose="020B0604020202020204" pitchFamily="34" charset="0"/>
-                          <a:cs typeface="Arial" panose="020B0604020202020204" pitchFamily="34" charset="0"/>
-                        </a:rPr>
-                        <a:t> </a:t>
-                      </a:r>
-                    </a:p>
-                  </a:txBody>
-                  <a:tcPr anchor="ctr">
-                    <a:lnL w="12700" cap="flat" cmpd="sng" algn="ctr">
-                      <a:solidFill>
-                        <a:schemeClr val="tx1"/>
-                      </a:solidFill>
-                      <a:prstDash val="solid"/>
-                      <a:round/>
-                      <a:headEnd type="none" w="med" len="med"/>
-                      <a:tailEnd type="none" w="med" len="med"/>
-                    </a:lnL>
-                    <a:lnR w="12700" cap="flat" cmpd="sng" algn="ctr">
-                      <a:solidFill>
-                        <a:schemeClr val="tx1"/>
-                      </a:solidFill>
-                      <a:prstDash val="solid"/>
-                      <a:round/>
-                      <a:headEnd type="none" w="med" len="med"/>
-                      <a:tailEnd type="none" w="med" len="med"/>
-                    </a:lnR>
-                    <a:lnT w="12700" cap="flat" cmpd="sng" algn="ctr">
-                      <a:solidFill>
-                        <a:schemeClr val="tx1"/>
-                      </a:solidFill>
-                      <a:prstDash val="solid"/>
-                      <a:round/>
-                      <a:headEnd type="none" w="med" len="med"/>
-                      <a:tailEnd type="none" w="med" len="med"/>
-                    </a:lnT>
-                    <a:lnB w="12700" cap="flat" cmpd="sng" algn="ctr">
-                      <a:solidFill>
-                        <a:schemeClr val="tx1"/>
-                      </a:solidFill>
-                      <a:prstDash val="solid"/>
-                      <a:round/>
-                      <a:headEnd type="none" w="med" len="med"/>
-                      <a:tailEnd type="none" w="med" len="med"/>
-                    </a:lnB>
-                    <a:noFill/>
-                  </a:tcPr>
-                </a:tc>
-                <a:tc>
-                  <a:txBody>
-                    <a:bodyPr/>
-                    <a:lstStyle/>
-                    <a:p>
-                      <a:pPr algn="ctr"/>
-                      <a:r>
-                        <a:rPr lang="en-US" sz="2000" dirty="0">
-                          <a:solidFill>
-                            <a:schemeClr val="tx1"/>
-                          </a:solidFill>
-                          <a:latin typeface="Arial" panose="020B0604020202020204" pitchFamily="34" charset="0"/>
-                          <a:cs typeface="Arial" panose="020B0604020202020204" pitchFamily="34" charset="0"/>
-                        </a:rPr>
-                        <a:t>5</a:t>
-                      </a:r>
-                    </a:p>
-                  </a:txBody>
-                  <a:tcPr anchor="ctr">
-                    <a:lnL w="12700" cap="flat" cmpd="sng" algn="ctr">
-                      <a:solidFill>
-                        <a:schemeClr val="tx1"/>
-                      </a:solidFill>
-                      <a:prstDash val="solid"/>
-                      <a:round/>
-                      <a:headEnd type="none" w="med" len="med"/>
-                      <a:tailEnd type="none" w="med" len="med"/>
-                    </a:lnL>
-                    <a:lnR w="12700" cap="flat" cmpd="sng" algn="ctr">
-                      <a:solidFill>
-                        <a:schemeClr val="tx1"/>
-                      </a:solidFill>
-                      <a:prstDash val="solid"/>
-                      <a:round/>
-                      <a:headEnd type="none" w="med" len="med"/>
-                      <a:tailEnd type="none" w="med" len="med"/>
-                    </a:lnR>
-                    <a:lnT w="12700" cap="flat" cmpd="sng" algn="ctr">
-                      <a:solidFill>
-                        <a:schemeClr val="tx1"/>
-                      </a:solidFill>
-                      <a:prstDash val="solid"/>
-                      <a:round/>
-                      <a:headEnd type="none" w="med" len="med"/>
-                      <a:tailEnd type="none" w="med" len="med"/>
-                    </a:lnT>
-                    <a:lnB w="12700" cap="flat" cmpd="sng" algn="ctr">
-                      <a:solidFill>
-                        <a:schemeClr val="tx1"/>
-                      </a:solidFill>
-                      <a:prstDash val="solid"/>
-                      <a:round/>
-                      <a:headEnd type="none" w="med" len="med"/>
-                      <a:tailEnd type="none" w="med" len="med"/>
-                    </a:lnB>
-                    <a:noFill/>
-                  </a:tcPr>
-                </a:tc>
-                <a:extLst>
-                  <a:ext uri="{0D108BD9-81ED-4DB2-BD59-A6C34878D82A}">
-                    <a16:rowId xmlns:a16="http://schemas.microsoft.com/office/drawing/2014/main" val="4280125804"/>
                   </a:ext>
                 </a:extLst>
               </a:tr>
@@ -9704,14 +9403,14 @@
           <p:nvPr>
             <p:extLst>
               <p:ext uri="{D42A27DB-BD31-4B8C-83A1-F6EECF244321}">
-                <p14:modId xmlns:p14="http://schemas.microsoft.com/office/powerpoint/2010/main" val="7126856"/>
+                <p14:modId xmlns:p14="http://schemas.microsoft.com/office/powerpoint/2010/main" val="1339913855"/>
               </p:ext>
             </p:extLst>
           </p:nvPr>
         </p:nvGraphicFramePr>
         <p:xfrm>
           <a:off x="444708" y="1079430"/>
-          <a:ext cx="11302584" cy="5120640"/>
+          <a:ext cx="11302584" cy="4754880"/>
         </p:xfrm>
         <a:graphic>
           <a:graphicData uri="http://schemas.openxmlformats.org/drawingml/2006/table">
@@ -9887,7 +9586,7 @@
                           <a:latin typeface="Arial" panose="020B0604020202020204" pitchFamily="34" charset="0"/>
                           <a:cs typeface="Arial" panose="020B0604020202020204" pitchFamily="34" charset="0"/>
                         </a:rPr>
-                        <a:t>About Seurat object as a class (slots, …)</a:t>
+                        <a:t>About Seurat object as a class</a:t>
                       </a:r>
                     </a:p>
                   </a:txBody>
@@ -10042,7 +9741,36 @@
                           <a:latin typeface="Arial" panose="020B0604020202020204" pitchFamily="34" charset="0"/>
                           <a:cs typeface="Arial" panose="020B0604020202020204" pitchFamily="34" charset="0"/>
                         </a:rPr>
-                        <a:t>Classification of low quality cells from single-cell RNA-seq data (Sarah A. </a:t>
+                        <a:t>Classification of low quality cells from single-cell RNA-seq data </a:t>
+                      </a:r>
+                    </a:p>
+                    <a:p>
+                      <a:pPr marL="0" marR="0" indent="0" algn="l" defTabSz="914400" rtl="0" eaLnBrk="1" fontAlgn="auto" latinLnBrk="0" hangingPunct="1">
+                        <a:lnSpc>
+                          <a:spcPct val="100000"/>
+                        </a:lnSpc>
+                        <a:spcBef>
+                          <a:spcPts val="0"/>
+                        </a:spcBef>
+                        <a:spcAft>
+                          <a:spcPts val="0"/>
+                        </a:spcAft>
+                        <a:buClrTx/>
+                        <a:buSzTx/>
+                        <a:buFontTx/>
+                        <a:buNone/>
+                        <a:tabLst/>
+                        <a:defRPr/>
+                      </a:pPr>
+                      <a:r>
+                        <a:rPr lang="en-US" sz="2400" b="1" dirty="0">
+                          <a:solidFill>
+                            <a:schemeClr val="tx1"/>
+                          </a:solidFill>
+                          <a:latin typeface="Arial" panose="020B0604020202020204" pitchFamily="34" charset="0"/>
+                          <a:cs typeface="Arial" panose="020B0604020202020204" pitchFamily="34" charset="0"/>
+                        </a:rPr>
+                        <a:t>(Sarah A. </a:t>
                       </a:r>
                       <a:r>
                         <a:rPr lang="en-US" sz="2400" b="1" dirty="0" err="1">

</xml_diff>